<commit_message>
presentación: scrum, sin terminar
</commit_message>
<xml_diff>
--- a/presentacion1.pptx
+++ b/presentacion1.pptx
@@ -8,6 +8,7 @@
     <p:sldId id="256" r:id="rId2"/>
     <p:sldId id="257" r:id="rId3"/>
     <p:sldId id="258" r:id="rId4"/>
+    <p:sldId id="259" r:id="rId5"/>
   </p:sldIdLst>
   <p:sldSz cx="12192000" cy="6858000"/>
   <p:notesSz cx="6858000" cy="9144000"/>
@@ -106,24 +107,21 @@
       </a:defRPr>
     </a:lvl9pPr>
   </p:defaultTextStyle>
+  <p:extLst>
+    <p:ext uri="{EFAFB233-063F-42B5-8137-9DF3F51BA10A}">
+      <p15:sldGuideLst xmlns:p15="http://schemas.microsoft.com/office/powerpoint/2012/main"/>
+    </p:ext>
+  </p:extLst>
 </p:presentation>
 </file>
 
 <file path=ppt/commentAuthors.xml><?xml version="1.0" encoding="utf-8"?>
 <p:cmAuthorLst xmlns:a="http://schemas.openxmlformats.org/drawingml/2006/main" xmlns:r="http://schemas.openxmlformats.org/officeDocument/2006/relationships" xmlns:p="http://schemas.openxmlformats.org/presentationml/2006/main">
   <p:cmAuthor id="1" name="Usuario de Microsoft Office" initials="Office" lastIdx="1" clrIdx="0">
-    <p:extLst>
-      <p:ext uri="{19B8F6BF-5375-455C-9EA6-DF929625EA0E}">
-        <p15:presenceInfo xmlns:p15="http://schemas.microsoft.com/office/powerpoint/2012/main" userId="" providerId=""/>
-      </p:ext>
-    </p:extLst>
+    <p:extLst/>
   </p:cmAuthor>
   <p:cmAuthor id="2" name="Usuario de Microsoft Office" initials="Office [2]" lastIdx="1" clrIdx="1">
-    <p:extLst>
-      <p:ext uri="{19B8F6BF-5375-455C-9EA6-DF929625EA0E}">
-        <p15:presenceInfo xmlns:p15="http://schemas.microsoft.com/office/powerpoint/2012/main" userId="" providerId=""/>
-      </p:ext>
-    </p:extLst>
+    <p:extLst/>
   </p:cmAuthor>
 </p:cmAuthorLst>
 </file>
@@ -4270,24 +4268,14 @@
           <a:p>
             <a:r>
               <a:rPr lang="es-ES_tradnl" dirty="0" smtClean="0"/>
-              <a:t>- Sergio Garc</a:t>
-            </a:r>
+              <a:t>- Sergio García Urdiales</a:t>
+            </a:r>
+          </a:p>
+          <a:p>
             <a:r>
               <a:rPr lang="es-ES_tradnl" dirty="0" smtClean="0"/>
-              <a:t>ía Urdiales</a:t>
-            </a:r>
-            <a:endParaRPr lang="es-ES_tradnl" dirty="0" smtClean="0"/>
-          </a:p>
-          <a:p>
-            <a:r>
-              <a:rPr lang="es-ES_tradnl" dirty="0" smtClean="0"/>
-              <a:t>- Mario Mart</a:t>
-            </a:r>
-            <a:r>
-              <a:rPr lang="es-ES_tradnl" dirty="0" smtClean="0"/>
-              <a:t>ínez Alfonso</a:t>
-            </a:r>
-            <a:endParaRPr lang="es-ES_tradnl" dirty="0" smtClean="0"/>
+              <a:t>- Mario Martínez Alfonso</a:t>
+            </a:r>
           </a:p>
           <a:p>
             <a:r>
@@ -4298,11 +4286,7 @@
           <a:p>
             <a:r>
               <a:rPr lang="es-ES_tradnl" dirty="0" smtClean="0"/>
-              <a:t>- Jes</a:t>
-            </a:r>
-            <a:r>
-              <a:rPr lang="es-ES_tradnl" dirty="0" smtClean="0"/>
-              <a:t>ús Perales Hernández</a:t>
+              <a:t>- Jesús Perales Hernández</a:t>
             </a:r>
             <a:br>
               <a:rPr lang="es-ES_tradnl" dirty="0" smtClean="0"/>
@@ -4572,11 +4556,7 @@
           <a:p>
             <a:r>
               <a:rPr lang="es-ES_tradnl" smtClean="0"/>
-              <a:t>Herramienta colaborativa de gesti</a:t>
-            </a:r>
-            <a:r>
-              <a:rPr lang="es-ES_tradnl" smtClean="0"/>
-              <a:t>ón de actividades (GTD)</a:t>
+              <a:t>Herramienta colaborativa de gestión de actividades (GTD)</a:t>
             </a:r>
             <a:endParaRPr lang="es-ES_tradnl" dirty="0"/>
           </a:p>
@@ -4636,11 +4616,7 @@
           <a:p>
             <a:r>
               <a:rPr lang="es-ES_tradnl" dirty="0" smtClean="0"/>
-              <a:t>¿Qu</a:t>
-            </a:r>
-            <a:r>
-              <a:rPr lang="es-ES_tradnl" dirty="0" smtClean="0"/>
-              <a:t>é es y para qué es un GDT?</a:t>
+              <a:t>¿Qué es y para qué es un GDT?</a:t>
             </a:r>
             <a:br>
               <a:rPr lang="es-ES_tradnl" dirty="0" smtClean="0"/>
@@ -4673,11 +4649,7 @@
           <a:p>
             <a:r>
               <a:rPr lang="es-ES_tradnl" sz="2800" dirty="0" smtClean="0"/>
-              <a:t>Es un m</a:t>
-            </a:r>
-            <a:r>
-              <a:rPr lang="es-ES_tradnl" sz="2800" dirty="0" smtClean="0"/>
-              <a:t>étodo de gestión de las actividades.</a:t>
+              <a:t>Es un método de gestión de las actividades.</a:t>
             </a:r>
           </a:p>
           <a:p>
@@ -4796,15 +4768,7 @@
                   <a:schemeClr val="tx1"/>
                 </a:solidFill>
               </a:rPr>
-              <a:t>la realizaci</a:t>
-            </a:r>
-            <a:r>
-              <a:rPr lang="es-ES_tradnl" sz="2400" dirty="0" smtClean="0">
-                <a:solidFill>
-                  <a:schemeClr val="tx1"/>
-                </a:solidFill>
-              </a:rPr>
-              <a:t>ón de las tareas.</a:t>
+              <a:t>la realización de las tareas.</a:t>
             </a:r>
             <a:endParaRPr lang="es-ES_tradnl" sz="2400" dirty="0">
               <a:solidFill>
@@ -4846,6 +4810,49 @@
       </p:grpSpPr>
       <p:sp>
         <p:nvSpPr>
+          <p:cNvPr id="14" name="Triángulo 13"/>
+          <p:cNvSpPr/>
+          <p:nvPr/>
+        </p:nvSpPr>
+        <p:spPr>
+          <a:xfrm>
+            <a:off x="7685222" y="3680647"/>
+            <a:ext cx="3317357" cy="2102831"/>
+          </a:xfrm>
+          <a:prstGeom prst="triangle">
+            <a:avLst/>
+          </a:prstGeom>
+        </p:spPr>
+        <p:style>
+          <a:lnRef idx="2">
+            <a:schemeClr val="accent1">
+              <a:shade val="50000"/>
+            </a:schemeClr>
+          </a:lnRef>
+          <a:fillRef idx="1">
+            <a:schemeClr val="accent1"/>
+          </a:fillRef>
+          <a:effectRef idx="0">
+            <a:schemeClr val="accent1"/>
+          </a:effectRef>
+          <a:fontRef idx="minor">
+            <a:schemeClr val="lt1"/>
+          </a:fontRef>
+        </p:style>
+        <p:txBody>
+          <a:bodyPr rtlCol="0" anchor="ctr"/>
+          <a:lstStyle/>
+          <a:p>
+            <a:pPr algn="ctr"/>
+            <a:r>
+              <a:rPr lang="es-ES_tradnl" dirty="0"/>
+              <a:t>Entregas parciales y regulares.</a:t>
+            </a:r>
+          </a:p>
+        </p:txBody>
+      </p:sp>
+      <p:sp>
+        <p:nvSpPr>
           <p:cNvPr id="2" name="Título 1"/>
           <p:cNvSpPr>
             <a:spLocks noGrp="1"/>
@@ -4868,7 +4875,11 @@
           <a:p>
             <a:r>
               <a:rPr lang="es-ES_tradnl" dirty="0" smtClean="0"/>
-              <a:t>Crisantemo: nosotros</a:t>
+              <a:t>¿Qu</a:t>
+            </a:r>
+            <a:r>
+              <a:rPr lang="es-ES_tradnl" dirty="0" smtClean="0"/>
+              <a:t>é es SCRUM?</a:t>
             </a:r>
             <a:endParaRPr lang="es-ES_tradnl" dirty="0"/>
           </a:p>
@@ -4887,7 +4898,7 @@
         <p:spPr>
           <a:xfrm>
             <a:off x="912628" y="1658679"/>
-            <a:ext cx="10366742" cy="4161506"/>
+            <a:ext cx="10366742" cy="1212112"/>
           </a:xfrm>
         </p:spPr>
         <p:txBody>
@@ -4896,7 +4907,702 @@
           </a:bodyPr>
           <a:lstStyle/>
           <a:p>
+            <a:r>
+              <a:rPr lang="es-ES_tradnl" sz="2800" dirty="0" smtClean="0"/>
+              <a:t>Proceso en el que se aplican de manera regular un conjunto de buenas pr</a:t>
+            </a:r>
+            <a:r>
+              <a:rPr lang="es-ES_tradnl" sz="2800" dirty="0" smtClean="0"/>
+              <a:t>ácticas para </a:t>
+            </a:r>
+            <a:r>
+              <a:rPr lang="es-ES_tradnl" sz="2800" b="1" dirty="0" smtClean="0"/>
+              <a:t>trabajar colaborativamente</a:t>
+            </a:r>
+            <a:r>
+              <a:rPr lang="es-ES_tradnl" sz="2800" dirty="0" smtClean="0"/>
+              <a:t>, en </a:t>
+            </a:r>
+            <a:r>
+              <a:rPr lang="es-ES_tradnl" sz="2800" b="1" dirty="0" smtClean="0"/>
+              <a:t>equipo</a:t>
+            </a:r>
+            <a:r>
+              <a:rPr lang="es-ES_tradnl" sz="2800" dirty="0"/>
+              <a:t>.</a:t>
+            </a:r>
             <a:endParaRPr lang="es-ES_tradnl" sz="2800" dirty="0"/>
+          </a:p>
+        </p:txBody>
+      </p:sp>
+      <p:sp>
+        <p:nvSpPr>
+          <p:cNvPr id="4" name="Marcador de contenido 2"/>
+          <p:cNvSpPr txBox="1">
+            <a:spLocks/>
+          </p:cNvSpPr>
+          <p:nvPr/>
+        </p:nvSpPr>
+        <p:spPr>
+          <a:xfrm>
+            <a:off x="912628" y="2870791"/>
+            <a:ext cx="5041605" cy="2658140"/>
+          </a:xfrm>
+          <a:prstGeom prst="rect">
+            <a:avLst/>
+          </a:prstGeom>
+        </p:spPr>
+        <p:txBody>
+          <a:bodyPr vert="horz" lIns="91440" tIns="45720" rIns="91440" bIns="45720" rtlCol="0">
+            <a:normAutofit/>
+          </a:bodyPr>
+          <a:lstStyle>
+            <a:lvl1pPr marL="283464" indent="-283464" algn="l" defTabSz="914400" rtl="0" eaLnBrk="1" latinLnBrk="0" hangingPunct="1">
+              <a:lnSpc>
+                <a:spcPct val="112000"/>
+              </a:lnSpc>
+              <a:spcBef>
+                <a:spcPts val="900"/>
+              </a:spcBef>
+              <a:buFont typeface="Arial" panose="020B0604020202020204" pitchFamily="34" charset="0"/>
+              <a:buChar char="•"/>
+              <a:defRPr sz="2000" kern="1200" baseline="0">
+                <a:solidFill>
+                  <a:schemeClr val="tx1">
+                    <a:lumMod val="85000"/>
+                    <a:lumOff val="15000"/>
+                  </a:schemeClr>
+                </a:solidFill>
+                <a:latin typeface="+mn-lt"/>
+                <a:ea typeface="+mn-ea"/>
+                <a:cs typeface="+mn-cs"/>
+              </a:defRPr>
+            </a:lvl1pPr>
+            <a:lvl2pPr marL="283464" indent="-283464" algn="l" defTabSz="914400" rtl="0" eaLnBrk="1" latinLnBrk="0" hangingPunct="1">
+              <a:lnSpc>
+                <a:spcPct val="112000"/>
+              </a:lnSpc>
+              <a:spcBef>
+                <a:spcPts val="900"/>
+              </a:spcBef>
+              <a:buFont typeface="Corbel" panose="020B0503020204020204" pitchFamily="34" charset="0"/>
+              <a:buChar char="–"/>
+              <a:defRPr sz="1800" kern="1200" baseline="0">
+                <a:solidFill>
+                  <a:schemeClr val="tx1">
+                    <a:lumMod val="85000"/>
+                    <a:lumOff val="15000"/>
+                  </a:schemeClr>
+                </a:solidFill>
+                <a:latin typeface="+mn-lt"/>
+                <a:ea typeface="+mn-ea"/>
+                <a:cs typeface="+mn-cs"/>
+              </a:defRPr>
+            </a:lvl2pPr>
+            <a:lvl3pPr marL="283464" indent="-283464" algn="l" defTabSz="914400" rtl="0" eaLnBrk="1" latinLnBrk="0" hangingPunct="1">
+              <a:lnSpc>
+                <a:spcPct val="112000"/>
+              </a:lnSpc>
+              <a:spcBef>
+                <a:spcPts val="900"/>
+              </a:spcBef>
+              <a:buFont typeface="Arial" panose="020B0604020202020204" pitchFamily="34" charset="0"/>
+              <a:buChar char="•"/>
+              <a:defRPr sz="1600" kern="1200" baseline="0">
+                <a:solidFill>
+                  <a:schemeClr val="tx1">
+                    <a:lumMod val="85000"/>
+                    <a:lumOff val="15000"/>
+                  </a:schemeClr>
+                </a:solidFill>
+                <a:latin typeface="+mn-lt"/>
+                <a:ea typeface="+mn-ea"/>
+                <a:cs typeface="+mn-cs"/>
+              </a:defRPr>
+            </a:lvl3pPr>
+            <a:lvl4pPr marL="283464" indent="-283464" algn="l" defTabSz="914400" rtl="0" eaLnBrk="1" latinLnBrk="0" hangingPunct="1">
+              <a:lnSpc>
+                <a:spcPct val="112000"/>
+              </a:lnSpc>
+              <a:spcBef>
+                <a:spcPts val="900"/>
+              </a:spcBef>
+              <a:buFont typeface="Corbel" panose="020B0503020204020204" pitchFamily="34" charset="0"/>
+              <a:buChar char="–"/>
+              <a:defRPr sz="1400" kern="1200" baseline="0">
+                <a:solidFill>
+                  <a:schemeClr val="tx1">
+                    <a:lumMod val="85000"/>
+                    <a:lumOff val="15000"/>
+                  </a:schemeClr>
+                </a:solidFill>
+                <a:latin typeface="+mn-lt"/>
+                <a:ea typeface="+mn-ea"/>
+                <a:cs typeface="+mn-cs"/>
+              </a:defRPr>
+            </a:lvl4pPr>
+            <a:lvl5pPr marL="283464" indent="-283464" algn="l" defTabSz="914400" rtl="0" eaLnBrk="1" latinLnBrk="0" hangingPunct="1">
+              <a:lnSpc>
+                <a:spcPct val="112000"/>
+              </a:lnSpc>
+              <a:spcBef>
+                <a:spcPts val="900"/>
+              </a:spcBef>
+              <a:buFont typeface="Arial" panose="020B0604020202020204" pitchFamily="34" charset="0"/>
+              <a:buChar char="•"/>
+              <a:defRPr sz="1400" i="1" kern="1200" baseline="0">
+                <a:solidFill>
+                  <a:schemeClr val="tx1">
+                    <a:lumMod val="85000"/>
+                    <a:lumOff val="15000"/>
+                  </a:schemeClr>
+                </a:solidFill>
+                <a:latin typeface="+mn-lt"/>
+                <a:ea typeface="+mn-ea"/>
+                <a:cs typeface="+mn-cs"/>
+              </a:defRPr>
+            </a:lvl5pPr>
+            <a:lvl6pPr marL="283464" indent="-283464" algn="l" defTabSz="914400" rtl="0" eaLnBrk="1" latinLnBrk="0" hangingPunct="1">
+              <a:lnSpc>
+                <a:spcPct val="112000"/>
+              </a:lnSpc>
+              <a:spcBef>
+                <a:spcPts val="1300"/>
+              </a:spcBef>
+              <a:buFont typeface="Corbel" panose="020B0503020204020204" pitchFamily="34" charset="0"/>
+              <a:buChar char="–"/>
+              <a:defRPr sz="1400" kern="1200">
+                <a:solidFill>
+                  <a:schemeClr val="tx1">
+                    <a:lumMod val="85000"/>
+                    <a:lumOff val="15000"/>
+                  </a:schemeClr>
+                </a:solidFill>
+                <a:latin typeface="+mn-lt"/>
+                <a:ea typeface="+mn-ea"/>
+                <a:cs typeface="+mn-cs"/>
+              </a:defRPr>
+            </a:lvl6pPr>
+            <a:lvl7pPr marL="283464" indent="-283464" algn="l" defTabSz="914400" rtl="0" eaLnBrk="1" latinLnBrk="0" hangingPunct="1">
+              <a:lnSpc>
+                <a:spcPct val="112000"/>
+              </a:lnSpc>
+              <a:spcBef>
+                <a:spcPts val="1300"/>
+              </a:spcBef>
+              <a:buFont typeface="Arial" panose="020B0604020202020204" pitchFamily="34" charset="0"/>
+              <a:buChar char="•"/>
+              <a:defRPr sz="1400" i="1" kern="1200">
+                <a:solidFill>
+                  <a:schemeClr val="tx1">
+                    <a:lumMod val="85000"/>
+                    <a:lumOff val="15000"/>
+                  </a:schemeClr>
+                </a:solidFill>
+                <a:latin typeface="+mn-lt"/>
+                <a:ea typeface="+mn-ea"/>
+                <a:cs typeface="+mn-cs"/>
+              </a:defRPr>
+            </a:lvl7pPr>
+            <a:lvl8pPr marL="283464" indent="-283464" algn="l" defTabSz="914400" rtl="0" eaLnBrk="1" latinLnBrk="0" hangingPunct="1">
+              <a:lnSpc>
+                <a:spcPct val="112000"/>
+              </a:lnSpc>
+              <a:spcBef>
+                <a:spcPts val="1300"/>
+              </a:spcBef>
+              <a:buFont typeface="Corbel" panose="020B0503020204020204" pitchFamily="34" charset="0"/>
+              <a:buChar char="–"/>
+              <a:defRPr sz="1400" kern="1200">
+                <a:solidFill>
+                  <a:schemeClr val="tx1">
+                    <a:lumMod val="85000"/>
+                    <a:lumOff val="15000"/>
+                  </a:schemeClr>
+                </a:solidFill>
+                <a:latin typeface="+mn-lt"/>
+                <a:ea typeface="+mn-ea"/>
+                <a:cs typeface="+mn-cs"/>
+              </a:defRPr>
+            </a:lvl8pPr>
+            <a:lvl9pPr marL="283464" indent="-283464" algn="l" defTabSz="914400" rtl="0" eaLnBrk="1" latinLnBrk="0" hangingPunct="1">
+              <a:lnSpc>
+                <a:spcPct val="112000"/>
+              </a:lnSpc>
+              <a:spcBef>
+                <a:spcPts val="1300"/>
+              </a:spcBef>
+              <a:buFont typeface="Arial" panose="020B0604020202020204" pitchFamily="34" charset="0"/>
+              <a:buChar char="•"/>
+              <a:defRPr sz="1400" i="1" kern="1200" baseline="0">
+                <a:solidFill>
+                  <a:schemeClr val="tx1">
+                    <a:lumMod val="85000"/>
+                    <a:lumOff val="15000"/>
+                  </a:schemeClr>
+                </a:solidFill>
+                <a:latin typeface="+mn-lt"/>
+                <a:ea typeface="+mn-ea"/>
+                <a:cs typeface="+mn-cs"/>
+              </a:defRPr>
+            </a:lvl9pPr>
+          </a:lstStyle>
+          <a:p>
+            <a:endParaRPr lang="es-ES_tradnl" sz="2800" dirty="0" smtClean="0"/>
+          </a:p>
+          <a:p>
+            <a:r>
+              <a:rPr lang="es-ES_tradnl" sz="2800" dirty="0" smtClean="0"/>
+              <a:t>Bueno para </a:t>
+            </a:r>
+            <a:r>
+              <a:rPr lang="es-ES_tradnl" sz="2800" dirty="0" smtClean="0">
+                <a:solidFill>
+                  <a:schemeClr val="accent1"/>
+                </a:solidFill>
+              </a:rPr>
+              <a:t>el cliente</a:t>
+            </a:r>
+          </a:p>
+          <a:p>
+            <a:r>
+              <a:rPr lang="es-ES_tradnl" sz="2800" dirty="0" smtClean="0"/>
+              <a:t>Bueno para </a:t>
+            </a:r>
+            <a:r>
+              <a:rPr lang="es-ES_tradnl" sz="2800" dirty="0" smtClean="0">
+                <a:solidFill>
+                  <a:schemeClr val="accent1"/>
+                </a:solidFill>
+              </a:rPr>
+              <a:t>el equipo</a:t>
+            </a:r>
+          </a:p>
+          <a:p>
+            <a:endParaRPr lang="es-ES_tradnl" sz="2800" dirty="0"/>
+          </a:p>
+        </p:txBody>
+      </p:sp>
+      <p:sp>
+        <p:nvSpPr>
+          <p:cNvPr id="5" name="CuadroTexto 4"/>
+          <p:cNvSpPr txBox="1"/>
+          <p:nvPr/>
+        </p:nvSpPr>
+        <p:spPr>
+          <a:xfrm rot="20556019">
+            <a:off x="6224268" y="3079273"/>
+            <a:ext cx="2377908" cy="461665"/>
+          </a:xfrm>
+          <a:prstGeom prst="rect">
+            <a:avLst/>
+          </a:prstGeom>
+          <a:noFill/>
+        </p:spPr>
+        <p:txBody>
+          <a:bodyPr wrap="square" rtlCol="0">
+            <a:spAutoFit/>
+          </a:bodyPr>
+          <a:lstStyle/>
+          <a:p>
+            <a:r>
+              <a:rPr lang="es-ES_tradnl" sz="2400" dirty="0" smtClean="0">
+                <a:solidFill>
+                  <a:schemeClr val="tx2">
+                    <a:lumMod val="50000"/>
+                    <a:lumOff val="50000"/>
+                  </a:schemeClr>
+                </a:solidFill>
+              </a:rPr>
+              <a:t>Priorizaci</a:t>
+            </a:r>
+            <a:r>
+              <a:rPr lang="es-ES_tradnl" sz="2400" dirty="0" smtClean="0">
+                <a:solidFill>
+                  <a:schemeClr val="tx2">
+                    <a:lumMod val="50000"/>
+                    <a:lumOff val="50000"/>
+                  </a:schemeClr>
+                </a:solidFill>
+              </a:rPr>
+              <a:t>ón</a:t>
+            </a:r>
+            <a:endParaRPr lang="es-ES_tradnl" sz="2400" dirty="0">
+              <a:solidFill>
+                <a:schemeClr val="tx2">
+                  <a:lumMod val="50000"/>
+                  <a:lumOff val="50000"/>
+                </a:schemeClr>
+              </a:solidFill>
+            </a:endParaRPr>
+          </a:p>
+        </p:txBody>
+      </p:sp>
+      <p:sp>
+        <p:nvSpPr>
+          <p:cNvPr id="8" name="CuadroTexto 7"/>
+          <p:cNvSpPr txBox="1"/>
+          <p:nvPr/>
+        </p:nvSpPr>
+        <p:spPr>
+          <a:xfrm rot="708139">
+            <a:off x="7327981" y="2939509"/>
+            <a:ext cx="2105246" cy="954107"/>
+          </a:xfrm>
+          <a:prstGeom prst="rect">
+            <a:avLst/>
+          </a:prstGeom>
+          <a:noFill/>
+        </p:spPr>
+        <p:txBody>
+          <a:bodyPr wrap="square" rtlCol="0">
+            <a:spAutoFit/>
+          </a:bodyPr>
+          <a:lstStyle/>
+          <a:p>
+            <a:r>
+              <a:rPr lang="es-ES_tradnl" sz="3200" dirty="0">
+                <a:solidFill>
+                  <a:schemeClr val="accent1"/>
+                </a:solidFill>
+                <a:latin typeface="Abadi MT Condensed Light" charset="0"/>
+                <a:ea typeface="Abadi MT Condensed Light" charset="0"/>
+                <a:cs typeface="Abadi MT Condensed Light" charset="0"/>
+              </a:rPr>
+              <a:t>Resultados</a:t>
+            </a:r>
+          </a:p>
+          <a:p>
+            <a:endParaRPr lang="es-ES_tradnl" sz="2400" dirty="0">
+              <a:solidFill>
+                <a:schemeClr val="accent1"/>
+              </a:solidFill>
+              <a:latin typeface="Abadi MT Condensed Light" charset="0"/>
+              <a:ea typeface="Abadi MT Condensed Light" charset="0"/>
+              <a:cs typeface="Abadi MT Condensed Light" charset="0"/>
+            </a:endParaRPr>
+          </a:p>
+        </p:txBody>
+      </p:sp>
+      <p:sp>
+        <p:nvSpPr>
+          <p:cNvPr id="9" name="CuadroTexto 8"/>
+          <p:cNvSpPr txBox="1"/>
+          <p:nvPr/>
+        </p:nvSpPr>
+        <p:spPr>
+          <a:xfrm>
+            <a:off x="6005690" y="3529779"/>
+            <a:ext cx="2248346" cy="738664"/>
+          </a:xfrm>
+          <a:prstGeom prst="rect">
+            <a:avLst/>
+          </a:prstGeom>
+          <a:noFill/>
+        </p:spPr>
+        <p:txBody>
+          <a:bodyPr wrap="square" rtlCol="0">
+            <a:spAutoFit/>
+          </a:bodyPr>
+          <a:lstStyle/>
+          <a:p>
+            <a:r>
+              <a:rPr lang="es-ES_tradnl" sz="2400" i="1" dirty="0">
+                <a:solidFill>
+                  <a:schemeClr val="accent1">
+                    <a:lumMod val="75000"/>
+                  </a:schemeClr>
+                </a:solidFill>
+                <a:latin typeface="Adobe Caslon Pro" charset="0"/>
+                <a:ea typeface="Adobe Caslon Pro" charset="0"/>
+                <a:cs typeface="Adobe Caslon Pro" charset="0"/>
+              </a:rPr>
+              <a:t>Innovación</a:t>
+            </a:r>
+          </a:p>
+          <a:p>
+            <a:endParaRPr lang="es-ES_tradnl" dirty="0"/>
+          </a:p>
+        </p:txBody>
+      </p:sp>
+      <p:sp>
+        <p:nvSpPr>
+          <p:cNvPr id="11" name="Elipse 10"/>
+          <p:cNvSpPr/>
+          <p:nvPr/>
+        </p:nvSpPr>
+        <p:spPr>
+          <a:xfrm>
+            <a:off x="5911837" y="3913386"/>
+            <a:ext cx="3546771" cy="464083"/>
+          </a:xfrm>
+          <a:prstGeom prst="ellipse">
+            <a:avLst/>
+          </a:prstGeom>
+          <a:solidFill>
+            <a:schemeClr val="tx2">
+              <a:lumMod val="25000"/>
+              <a:lumOff val="75000"/>
+            </a:schemeClr>
+          </a:solidFill>
+        </p:spPr>
+        <p:style>
+          <a:lnRef idx="1">
+            <a:schemeClr val="accent1"/>
+          </a:lnRef>
+          <a:fillRef idx="3">
+            <a:schemeClr val="accent1"/>
+          </a:fillRef>
+          <a:effectRef idx="2">
+            <a:schemeClr val="accent1"/>
+          </a:effectRef>
+          <a:fontRef idx="minor">
+            <a:schemeClr val="lt1"/>
+          </a:fontRef>
+        </p:style>
+        <p:txBody>
+          <a:bodyPr rtlCol="0" anchor="ctr"/>
+          <a:lstStyle/>
+          <a:p>
+            <a:r>
+              <a:rPr lang="es-ES_tradnl" sz="2400" dirty="0">
+                <a:solidFill>
+                  <a:schemeClr val="accent1">
+                    <a:lumMod val="75000"/>
+                  </a:schemeClr>
+                </a:solidFill>
+              </a:rPr>
+              <a:t>Competitividad</a:t>
+            </a:r>
+            <a:endParaRPr lang="es-ES_tradnl" dirty="0">
+              <a:solidFill>
+                <a:schemeClr val="accent1">
+                  <a:lumMod val="75000"/>
+                </a:schemeClr>
+              </a:solidFill>
+            </a:endParaRPr>
+          </a:p>
+        </p:txBody>
+      </p:sp>
+      <p:sp>
+        <p:nvSpPr>
+          <p:cNvPr id="10" name="Rectángulo 9"/>
+          <p:cNvSpPr/>
+          <p:nvPr/>
+        </p:nvSpPr>
+        <p:spPr>
+          <a:xfrm rot="1125431">
+            <a:off x="8008313" y="3877845"/>
+            <a:ext cx="3205969" cy="431379"/>
+          </a:xfrm>
+          <a:prstGeom prst="rect">
+            <a:avLst/>
+          </a:prstGeom>
+          <a:solidFill>
+            <a:schemeClr val="tx2">
+              <a:lumMod val="50000"/>
+              <a:lumOff val="50000"/>
+            </a:schemeClr>
+          </a:solidFill>
+        </p:spPr>
+        <p:style>
+          <a:lnRef idx="3">
+            <a:schemeClr val="lt1"/>
+          </a:lnRef>
+          <a:fillRef idx="1">
+            <a:schemeClr val="accent1"/>
+          </a:fillRef>
+          <a:effectRef idx="1">
+            <a:schemeClr val="accent1"/>
+          </a:effectRef>
+          <a:fontRef idx="minor">
+            <a:schemeClr val="lt1"/>
+          </a:fontRef>
+        </p:style>
+        <p:txBody>
+          <a:bodyPr rtlCol="0" anchor="ctr"/>
+          <a:lstStyle/>
+          <a:p>
+            <a:r>
+              <a:rPr lang="es-ES_tradnl" sz="2400" dirty="0"/>
+              <a:t>Requisitos cambiantes</a:t>
+            </a:r>
+          </a:p>
+        </p:txBody>
+      </p:sp>
+      <p:sp>
+        <p:nvSpPr>
+          <p:cNvPr id="13" name="Placa 12"/>
+          <p:cNvSpPr/>
+          <p:nvPr/>
+        </p:nvSpPr>
+        <p:spPr>
+          <a:xfrm>
+            <a:off x="6189593" y="4516347"/>
+            <a:ext cx="2447257" cy="777955"/>
+          </a:xfrm>
+          <a:prstGeom prst="plaque">
+            <a:avLst/>
+          </a:prstGeom>
+          <a:solidFill>
+            <a:schemeClr val="tx2">
+              <a:lumMod val="10000"/>
+              <a:lumOff val="90000"/>
+            </a:schemeClr>
+          </a:solidFill>
+        </p:spPr>
+        <p:style>
+          <a:lnRef idx="2">
+            <a:schemeClr val="accent1">
+              <a:shade val="50000"/>
+            </a:schemeClr>
+          </a:lnRef>
+          <a:fillRef idx="1">
+            <a:schemeClr val="accent1"/>
+          </a:fillRef>
+          <a:effectRef idx="0">
+            <a:schemeClr val="accent1"/>
+          </a:effectRef>
+          <a:fontRef idx="minor">
+            <a:schemeClr val="lt1"/>
+          </a:fontRef>
+        </p:style>
+        <p:txBody>
+          <a:bodyPr rtlCol="0" anchor="ctr"/>
+          <a:lstStyle/>
+          <a:p>
+            <a:pPr algn="ctr"/>
+            <a:r>
+              <a:rPr lang="es-ES_tradnl" sz="2800" dirty="0">
+                <a:solidFill>
+                  <a:schemeClr val="tx1"/>
+                </a:solidFill>
+              </a:rPr>
+              <a:t>Productividad</a:t>
+            </a:r>
+            <a:endParaRPr lang="es-ES_tradnl" dirty="0">
+              <a:solidFill>
+                <a:schemeClr val="tx1"/>
+              </a:solidFill>
+            </a:endParaRPr>
+          </a:p>
+        </p:txBody>
+      </p:sp>
+      <p:sp>
+        <p:nvSpPr>
+          <p:cNvPr id="12" name="CuadroTexto 11"/>
+          <p:cNvSpPr txBox="1"/>
+          <p:nvPr/>
+        </p:nvSpPr>
+        <p:spPr>
+          <a:xfrm rot="21310603">
+            <a:off x="8022608" y="4292435"/>
+            <a:ext cx="2518451" cy="523220"/>
+          </a:xfrm>
+          <a:prstGeom prst="rect">
+            <a:avLst/>
+          </a:prstGeom>
+          <a:noFill/>
+        </p:spPr>
+        <p:txBody>
+          <a:bodyPr wrap="square" rtlCol="0">
+            <a:spAutoFit/>
+          </a:bodyPr>
+          <a:lstStyle/>
+          <a:p>
+            <a:r>
+              <a:rPr lang="es-ES_tradnl" sz="2800" dirty="0">
+                <a:solidFill>
+                  <a:srgbClr val="00B0F0"/>
+                </a:solidFill>
+                <a:latin typeface="Adobe Gothic Std B" charset="-127"/>
+                <a:ea typeface="Adobe Gothic Std B" charset="-127"/>
+                <a:cs typeface="Adobe Gothic Std B" charset="-127"/>
+              </a:rPr>
+              <a:t>Flexibilidad</a:t>
+            </a:r>
+            <a:endParaRPr lang="es-ES_tradnl" dirty="0">
+              <a:solidFill>
+                <a:srgbClr val="00B0F0"/>
+              </a:solidFill>
+              <a:latin typeface="Adobe Gothic Std B" charset="-127"/>
+              <a:ea typeface="Adobe Gothic Std B" charset="-127"/>
+              <a:cs typeface="Adobe Gothic Std B" charset="-127"/>
+            </a:endParaRPr>
+          </a:p>
+        </p:txBody>
+      </p:sp>
+      <p:sp>
+        <p:nvSpPr>
+          <p:cNvPr id="16" name="CuadroTexto 15"/>
+          <p:cNvSpPr txBox="1"/>
+          <p:nvPr/>
+        </p:nvSpPr>
+        <p:spPr>
+          <a:xfrm rot="21168740">
+            <a:off x="9041818" y="3254398"/>
+            <a:ext cx="1254513" cy="463476"/>
+          </a:xfrm>
+          <a:prstGeom prst="rect">
+            <a:avLst/>
+          </a:prstGeom>
+          <a:solidFill>
+            <a:schemeClr val="tx2">
+              <a:lumMod val="10000"/>
+              <a:lumOff val="90000"/>
+            </a:schemeClr>
+          </a:solidFill>
+        </p:spPr>
+        <p:txBody>
+          <a:bodyPr wrap="square" rtlCol="0">
+            <a:spAutoFit/>
+          </a:bodyPr>
+          <a:lstStyle/>
+          <a:p>
+            <a:r>
+              <a:rPr lang="es-ES_tradnl" sz="2400" b="1" i="1" dirty="0" smtClean="0"/>
+              <a:t>Calidad </a:t>
+            </a:r>
+            <a:endParaRPr lang="es-ES_tradnl" b="1" i="1" dirty="0"/>
+          </a:p>
+        </p:txBody>
+      </p:sp>
+      <p:sp>
+        <p:nvSpPr>
+          <p:cNvPr id="15" name="CuadroTexto 14"/>
+          <p:cNvSpPr txBox="1"/>
+          <p:nvPr/>
+        </p:nvSpPr>
+        <p:spPr>
+          <a:xfrm rot="598830">
+            <a:off x="6012867" y="5333840"/>
+            <a:ext cx="1767930" cy="830997"/>
+          </a:xfrm>
+          <a:prstGeom prst="rect">
+            <a:avLst/>
+          </a:prstGeom>
+          <a:noFill/>
+        </p:spPr>
+        <p:txBody>
+          <a:bodyPr wrap="square" rtlCol="0">
+            <a:spAutoFit/>
+          </a:bodyPr>
+          <a:lstStyle/>
+          <a:p>
+            <a:pPr algn="r"/>
+            <a:r>
+              <a:rPr lang="es-ES_tradnl" sz="2400" dirty="0" smtClean="0">
+                <a:solidFill>
+                  <a:schemeClr val="accent1"/>
+                </a:solidFill>
+              </a:rPr>
+              <a:t>Constancia de entregas</a:t>
+            </a:r>
+            <a:endParaRPr lang="es-ES_tradnl" sz="2400" dirty="0">
+              <a:solidFill>
+                <a:schemeClr val="accent1"/>
+              </a:solidFill>
+            </a:endParaRPr>
           </a:p>
         </p:txBody>
       </p:sp>
@@ -4904,6 +5610,90 @@
     <p:extLst>
       <p:ext uri="{BB962C8B-B14F-4D97-AF65-F5344CB8AC3E}">
         <p14:creationId xmlns:p14="http://schemas.microsoft.com/office/powerpoint/2010/main" val="483689685"/>
+      </p:ext>
+    </p:extLst>
+  </p:cSld>
+  <p:clrMapOvr>
+    <a:masterClrMapping/>
+  </p:clrMapOvr>
+</p:sld>
+</file>
+
+<file path=ppt/slides/slide4.xml><?xml version="1.0" encoding="utf-8"?>
+<p:sld xmlns:a="http://schemas.openxmlformats.org/drawingml/2006/main" xmlns:r="http://schemas.openxmlformats.org/officeDocument/2006/relationships" xmlns:p="http://schemas.openxmlformats.org/presentationml/2006/main">
+  <p:cSld>
+    <p:spTree>
+      <p:nvGrpSpPr>
+        <p:cNvPr id="1" name=""/>
+        <p:cNvGrpSpPr/>
+        <p:nvPr/>
+      </p:nvGrpSpPr>
+      <p:grpSpPr>
+        <a:xfrm>
+          <a:off x="0" y="0"/>
+          <a:ext cx="0" cy="0"/>
+          <a:chOff x="0" y="0"/>
+          <a:chExt cx="0" cy="0"/>
+        </a:xfrm>
+      </p:grpSpPr>
+      <p:sp>
+        <p:nvSpPr>
+          <p:cNvPr id="2" name="Título 1"/>
+          <p:cNvSpPr>
+            <a:spLocks noGrp="1"/>
+          </p:cNvSpPr>
+          <p:nvPr>
+            <p:ph type="title"/>
+          </p:nvPr>
+        </p:nvSpPr>
+        <p:spPr>
+          <a:xfrm>
+            <a:off x="762000" y="559678"/>
+            <a:ext cx="10667998" cy="1290387"/>
+          </a:xfrm>
+        </p:spPr>
+        <p:txBody>
+          <a:bodyPr>
+            <a:normAutofit/>
+          </a:bodyPr>
+          <a:lstStyle/>
+          <a:p>
+            <a:r>
+              <a:rPr lang="es-ES_tradnl" dirty="0" smtClean="0"/>
+              <a:t>Crisantemo: nosotros</a:t>
+            </a:r>
+            <a:endParaRPr lang="es-ES_tradnl" dirty="0"/>
+          </a:p>
+        </p:txBody>
+      </p:sp>
+      <p:sp>
+        <p:nvSpPr>
+          <p:cNvPr id="3" name="Marcador de contenido 2"/>
+          <p:cNvSpPr>
+            <a:spLocks noGrp="1"/>
+          </p:cNvSpPr>
+          <p:nvPr>
+            <p:ph idx="1"/>
+          </p:nvPr>
+        </p:nvSpPr>
+        <p:spPr>
+          <a:xfrm>
+            <a:off x="762000" y="1850065"/>
+            <a:ext cx="10667998" cy="4019107"/>
+          </a:xfrm>
+        </p:spPr>
+        <p:txBody>
+          <a:bodyPr/>
+          <a:lstStyle/>
+          <a:p>
+            <a:endParaRPr lang="es-ES_tradnl" dirty="0"/>
+          </a:p>
+        </p:txBody>
+      </p:sp>
+    </p:spTree>
+    <p:extLst>
+      <p:ext uri="{BB962C8B-B14F-4D97-AF65-F5344CB8AC3E}">
+        <p14:creationId xmlns:p14="http://schemas.microsoft.com/office/powerpoint/2010/main" val="371653516"/>
       </p:ext>
     </p:extLst>
   </p:cSld>

</xml_diff>